<commit_message>
Updated scripts and reports for 2103RL.
</commit_message>
<xml_diff>
--- a/Images/vessel_images.pptx
+++ b/Images/vessel_images.pptx
@@ -7,6 +7,7 @@
   <p:sldIdLst>
     <p:sldId id="256" r:id="rId2"/>
     <p:sldId id="257" r:id="rId3"/>
+    <p:sldId id="258" r:id="rId4"/>
   </p:sldIdLst>
   <p:sldSz cx="12192000" cy="6858000"/>
   <p:notesSz cx="6858000" cy="9144000"/>
@@ -255,7 +256,7 @@
           <a:p>
             <a:fld id="{2E6797D7-AA8C-4B83-B18E-E9A3F3893ACA}" type="datetimeFigureOut">
               <a:rPr lang="en-US" smtClean="0"/>
-              <a:t>9/13/2019</a:t>
+              <a:t>7/23/2021</a:t>
             </a:fld>
             <a:endParaRPr lang="en-US"/>
           </a:p>
@@ -425,7 +426,7 @@
           <a:p>
             <a:fld id="{2E6797D7-AA8C-4B83-B18E-E9A3F3893ACA}" type="datetimeFigureOut">
               <a:rPr lang="en-US" smtClean="0"/>
-              <a:t>9/13/2019</a:t>
+              <a:t>7/23/2021</a:t>
             </a:fld>
             <a:endParaRPr lang="en-US"/>
           </a:p>
@@ -605,7 +606,7 @@
           <a:p>
             <a:fld id="{2E6797D7-AA8C-4B83-B18E-E9A3F3893ACA}" type="datetimeFigureOut">
               <a:rPr lang="en-US" smtClean="0"/>
-              <a:t>9/13/2019</a:t>
+              <a:t>7/23/2021</a:t>
             </a:fld>
             <a:endParaRPr lang="en-US"/>
           </a:p>
@@ -775,7 +776,7 @@
           <a:p>
             <a:fld id="{2E6797D7-AA8C-4B83-B18E-E9A3F3893ACA}" type="datetimeFigureOut">
               <a:rPr lang="en-US" smtClean="0"/>
-              <a:t>9/13/2019</a:t>
+              <a:t>7/23/2021</a:t>
             </a:fld>
             <a:endParaRPr lang="en-US"/>
           </a:p>
@@ -1021,7 +1022,7 @@
           <a:p>
             <a:fld id="{2E6797D7-AA8C-4B83-B18E-E9A3F3893ACA}" type="datetimeFigureOut">
               <a:rPr lang="en-US" smtClean="0"/>
-              <a:t>9/13/2019</a:t>
+              <a:t>7/23/2021</a:t>
             </a:fld>
             <a:endParaRPr lang="en-US"/>
           </a:p>
@@ -1253,7 +1254,7 @@
           <a:p>
             <a:fld id="{2E6797D7-AA8C-4B83-B18E-E9A3F3893ACA}" type="datetimeFigureOut">
               <a:rPr lang="en-US" smtClean="0"/>
-              <a:t>9/13/2019</a:t>
+              <a:t>7/23/2021</a:t>
             </a:fld>
             <a:endParaRPr lang="en-US"/>
           </a:p>
@@ -1620,7 +1621,7 @@
           <a:p>
             <a:fld id="{2E6797D7-AA8C-4B83-B18E-E9A3F3893ACA}" type="datetimeFigureOut">
               <a:rPr lang="en-US" smtClean="0"/>
-              <a:t>9/13/2019</a:t>
+              <a:t>7/23/2021</a:t>
             </a:fld>
             <a:endParaRPr lang="en-US"/>
           </a:p>
@@ -1738,7 +1739,7 @@
           <a:p>
             <a:fld id="{2E6797D7-AA8C-4B83-B18E-E9A3F3893ACA}" type="datetimeFigureOut">
               <a:rPr lang="en-US" smtClean="0"/>
-              <a:t>9/13/2019</a:t>
+              <a:t>7/23/2021</a:t>
             </a:fld>
             <a:endParaRPr lang="en-US"/>
           </a:p>
@@ -1833,7 +1834,7 @@
           <a:p>
             <a:fld id="{2E6797D7-AA8C-4B83-B18E-E9A3F3893ACA}" type="datetimeFigureOut">
               <a:rPr lang="en-US" smtClean="0"/>
-              <a:t>9/13/2019</a:t>
+              <a:t>7/23/2021</a:t>
             </a:fld>
             <a:endParaRPr lang="en-US"/>
           </a:p>
@@ -2110,7 +2111,7 @@
           <a:p>
             <a:fld id="{2E6797D7-AA8C-4B83-B18E-E9A3F3893ACA}" type="datetimeFigureOut">
               <a:rPr lang="en-US" smtClean="0"/>
-              <a:t>9/13/2019</a:t>
+              <a:t>7/23/2021</a:t>
             </a:fld>
             <a:endParaRPr lang="en-US"/>
           </a:p>
@@ -2363,7 +2364,7 @@
           <a:p>
             <a:fld id="{2E6797D7-AA8C-4B83-B18E-E9A3F3893ACA}" type="datetimeFigureOut">
               <a:rPr lang="en-US" smtClean="0"/>
-              <a:t>9/13/2019</a:t>
+              <a:t>7/23/2021</a:t>
             </a:fld>
             <a:endParaRPr lang="en-US"/>
           </a:p>
@@ -2576,7 +2577,7 @@
           <a:p>
             <a:fld id="{2E6797D7-AA8C-4B83-B18E-E9A3F3893ACA}" type="datetimeFigureOut">
               <a:rPr lang="en-US" smtClean="0"/>
-              <a:t>9/13/2019</a:t>
+              <a:t>7/23/2021</a:t>
             </a:fld>
             <a:endParaRPr lang="en-US"/>
           </a:p>
@@ -3332,6 +3333,120 @@
 </p:sld>
 </file>
 
+<file path=ppt/slides/slide3.xml><?xml version="1.0" encoding="utf-8"?>
+<p:sld xmlns:a="http://schemas.openxmlformats.org/drawingml/2006/main" xmlns:r="http://schemas.openxmlformats.org/officeDocument/2006/relationships" xmlns:p="http://schemas.openxmlformats.org/presentationml/2006/main">
+  <p:cSld>
+    <p:spTree>
+      <p:nvGrpSpPr>
+        <p:cNvPr id="1" name=""/>
+        <p:cNvGrpSpPr/>
+        <p:nvPr/>
+      </p:nvGrpSpPr>
+      <p:grpSpPr>
+        <a:xfrm>
+          <a:off x="0" y="0"/>
+          <a:ext cx="0" cy="0"/>
+          <a:chOff x="0" y="0"/>
+          <a:chExt cx="0" cy="0"/>
+        </a:xfrm>
+      </p:grpSpPr>
+      <p:grpSp>
+        <p:nvGrpSpPr>
+          <p:cNvPr id="2" name="Group 1"/>
+          <p:cNvGrpSpPr/>
+          <p:nvPr/>
+        </p:nvGrpSpPr>
+        <p:grpSpPr>
+          <a:xfrm>
+            <a:off x="957533" y="362309"/>
+            <a:ext cx="7666033" cy="5913937"/>
+            <a:chOff x="957533" y="362309"/>
+            <a:chExt cx="7666033" cy="5913937"/>
+          </a:xfrm>
+        </p:grpSpPr>
+        <p:pic>
+          <p:nvPicPr>
+            <p:cNvPr id="6" name="Picture 5"/>
+            <p:cNvPicPr>
+              <a:picLocks noChangeAspect="1"/>
+            </p:cNvPicPr>
+            <p:nvPr/>
+          </p:nvPicPr>
+          <p:blipFill rotWithShape="1">
+            <a:blip r:embed="rId2">
+              <a:extLst>
+                <a:ext uri="{28A0092B-C50C-407E-A947-70E740481C1C}">
+                  <a14:useLocalDpi xmlns:a14="http://schemas.microsoft.com/office/drawing/2010/main" val="0"/>
+                </a:ext>
+              </a:extLst>
+            </a:blip>
+            <a:srcRect l="16636" t="6476" r="12002" b="10947"/>
+            <a:stretch/>
+          </p:blipFill>
+          <p:spPr>
+            <a:xfrm>
+              <a:off x="957533" y="362309"/>
+              <a:ext cx="7666033" cy="5913937"/>
+            </a:xfrm>
+            <a:prstGeom prst="rect">
+              <a:avLst/>
+            </a:prstGeom>
+            <a:ln w="3175">
+              <a:solidFill>
+                <a:schemeClr val="tx1"/>
+              </a:solidFill>
+            </a:ln>
+          </p:spPr>
+        </p:pic>
+        <p:pic>
+          <p:nvPicPr>
+            <p:cNvPr id="9" name="Picture 8"/>
+            <p:cNvPicPr>
+              <a:picLocks noChangeAspect="1"/>
+            </p:cNvPicPr>
+            <p:nvPr/>
+          </p:nvPicPr>
+          <p:blipFill>
+            <a:blip r:embed="rId3">
+              <a:extLst>
+                <a:ext uri="{28A0092B-C50C-407E-A947-70E740481C1C}">
+                  <a14:useLocalDpi xmlns:a14="http://schemas.microsoft.com/office/drawing/2010/main" val="0"/>
+                </a:ext>
+              </a:extLst>
+            </a:blip>
+            <a:stretch>
+              <a:fillRect/>
+            </a:stretch>
+          </p:blipFill>
+          <p:spPr>
+            <a:xfrm>
+              <a:off x="5791987" y="451018"/>
+              <a:ext cx="2716771" cy="2041629"/>
+            </a:xfrm>
+            <a:prstGeom prst="rect">
+              <a:avLst/>
+            </a:prstGeom>
+            <a:ln w="3175">
+              <a:solidFill>
+                <a:schemeClr val="tx1"/>
+              </a:solidFill>
+            </a:ln>
+          </p:spPr>
+        </p:pic>
+      </p:grpSp>
+    </p:spTree>
+    <p:extLst>
+      <p:ext uri="{BB962C8B-B14F-4D97-AF65-F5344CB8AC3E}">
+        <p14:creationId xmlns:p14="http://schemas.microsoft.com/office/powerpoint/2010/main" val="3348215391"/>
+      </p:ext>
+    </p:extLst>
+  </p:cSld>
+  <p:clrMapOvr>
+    <a:masterClrMapping/>
+  </p:clrMapOvr>
+</p:sld>
+</file>
+
 <file path=ppt/theme/theme1.xml><?xml version="1.0" encoding="utf-8"?>
 <a:theme xmlns:a="http://schemas.openxmlformats.org/drawingml/2006/main" name="Office Theme">
   <a:themeElements>

</xml_diff>

<commit_message>
Seabird UCTD processing and vessel image PPT
</commit_message>
<xml_diff>
--- a/Images/vessel_images.pptx
+++ b/Images/vessel_images.pptx
@@ -7,8 +7,9 @@
   <p:sldIdLst>
     <p:sldId id="256" r:id="rId2"/>
     <p:sldId id="257" r:id="rId3"/>
-    <p:sldId id="260" r:id="rId4"/>
-    <p:sldId id="258" r:id="rId5"/>
+    <p:sldId id="261" r:id="rId4"/>
+    <p:sldId id="260" r:id="rId5"/>
+    <p:sldId id="258" r:id="rId6"/>
   </p:sldIdLst>
   <p:sldSz cx="12192000" cy="6858000"/>
   <p:notesSz cx="6858000" cy="9144000"/>
@@ -255,7 +256,7 @@
           <a:p>
             <a:fld id="{2E6797D7-AA8C-4B83-B18E-E9A3F3893ACA}" type="datetimeFigureOut">
               <a:rPr lang="en-US" smtClean="0"/>
-              <a:t>5/20/2022</a:t>
+              <a:t>8/8/2024</a:t>
             </a:fld>
             <a:endParaRPr lang="en-US"/>
           </a:p>
@@ -423,7 +424,7 @@
           <a:p>
             <a:fld id="{2E6797D7-AA8C-4B83-B18E-E9A3F3893ACA}" type="datetimeFigureOut">
               <a:rPr lang="en-US" smtClean="0"/>
-              <a:t>5/20/2022</a:t>
+              <a:t>8/8/2024</a:t>
             </a:fld>
             <a:endParaRPr lang="en-US"/>
           </a:p>
@@ -601,7 +602,7 @@
           <a:p>
             <a:fld id="{2E6797D7-AA8C-4B83-B18E-E9A3F3893ACA}" type="datetimeFigureOut">
               <a:rPr lang="en-US" smtClean="0"/>
-              <a:t>5/20/2022</a:t>
+              <a:t>8/8/2024</a:t>
             </a:fld>
             <a:endParaRPr lang="en-US"/>
           </a:p>
@@ -769,7 +770,7 @@
           <a:p>
             <a:fld id="{2E6797D7-AA8C-4B83-B18E-E9A3F3893ACA}" type="datetimeFigureOut">
               <a:rPr lang="en-US" smtClean="0"/>
-              <a:t>5/20/2022</a:t>
+              <a:t>8/8/2024</a:t>
             </a:fld>
             <a:endParaRPr lang="en-US"/>
           </a:p>
@@ -1014,7 +1015,7 @@
           <a:p>
             <a:fld id="{2E6797D7-AA8C-4B83-B18E-E9A3F3893ACA}" type="datetimeFigureOut">
               <a:rPr lang="en-US" smtClean="0"/>
-              <a:t>5/20/2022</a:t>
+              <a:t>8/8/2024</a:t>
             </a:fld>
             <a:endParaRPr lang="en-US"/>
           </a:p>
@@ -1243,7 +1244,7 @@
           <a:p>
             <a:fld id="{2E6797D7-AA8C-4B83-B18E-E9A3F3893ACA}" type="datetimeFigureOut">
               <a:rPr lang="en-US" smtClean="0"/>
-              <a:t>5/20/2022</a:t>
+              <a:t>8/8/2024</a:t>
             </a:fld>
             <a:endParaRPr lang="en-US"/>
           </a:p>
@@ -1607,7 +1608,7 @@
           <a:p>
             <a:fld id="{2E6797D7-AA8C-4B83-B18E-E9A3F3893ACA}" type="datetimeFigureOut">
               <a:rPr lang="en-US" smtClean="0"/>
-              <a:t>5/20/2022</a:t>
+              <a:t>8/8/2024</a:t>
             </a:fld>
             <a:endParaRPr lang="en-US"/>
           </a:p>
@@ -1724,7 +1725,7 @@
           <a:p>
             <a:fld id="{2E6797D7-AA8C-4B83-B18E-E9A3F3893ACA}" type="datetimeFigureOut">
               <a:rPr lang="en-US" smtClean="0"/>
-              <a:t>5/20/2022</a:t>
+              <a:t>8/8/2024</a:t>
             </a:fld>
             <a:endParaRPr lang="en-US"/>
           </a:p>
@@ -1819,7 +1820,7 @@
           <a:p>
             <a:fld id="{2E6797D7-AA8C-4B83-B18E-E9A3F3893ACA}" type="datetimeFigureOut">
               <a:rPr lang="en-US" smtClean="0"/>
-              <a:t>5/20/2022</a:t>
+              <a:t>8/8/2024</a:t>
             </a:fld>
             <a:endParaRPr lang="en-US"/>
           </a:p>
@@ -2094,7 +2095,7 @@
           <a:p>
             <a:fld id="{2E6797D7-AA8C-4B83-B18E-E9A3F3893ACA}" type="datetimeFigureOut">
               <a:rPr lang="en-US" smtClean="0"/>
-              <a:t>5/20/2022</a:t>
+              <a:t>8/8/2024</a:t>
             </a:fld>
             <a:endParaRPr lang="en-US"/>
           </a:p>
@@ -2346,7 +2347,7 @@
           <a:p>
             <a:fld id="{2E6797D7-AA8C-4B83-B18E-E9A3F3893ACA}" type="datetimeFigureOut">
               <a:rPr lang="en-US" smtClean="0"/>
-              <a:t>5/20/2022</a:t>
+              <a:t>8/8/2024</a:t>
             </a:fld>
             <a:endParaRPr lang="en-US"/>
           </a:p>
@@ -2557,7 +2558,7 @@
           <a:p>
             <a:fld id="{2E6797D7-AA8C-4B83-B18E-E9A3F3893ACA}" type="datetimeFigureOut">
               <a:rPr lang="en-US" smtClean="0"/>
-              <a:t>5/20/2022</a:t>
+              <a:t>8/8/2024</a:t>
             </a:fld>
             <a:endParaRPr lang="en-US"/>
           </a:p>
@@ -3338,6 +3339,155 @@
         </p:nvGrpSpPr>
         <p:grpSpPr>
           <a:xfrm>
+            <a:off x="957534" y="362309"/>
+            <a:ext cx="9464381" cy="4682657"/>
+            <a:chOff x="2441269" y="138022"/>
+            <a:chExt cx="8477443" cy="4194353"/>
+          </a:xfrm>
+        </p:grpSpPr>
+        <p:pic>
+          <p:nvPicPr>
+            <p:cNvPr id="6" name="Picture 5"/>
+            <p:cNvPicPr>
+              <a:picLocks noChangeAspect="1"/>
+            </p:cNvPicPr>
+            <p:nvPr/>
+          </p:nvPicPr>
+          <p:blipFill rotWithShape="1">
+            <a:blip r:embed="rId2">
+              <a:extLst>
+                <a:ext uri="{28A0092B-C50C-407E-A947-70E740481C1C}">
+                  <a14:useLocalDpi xmlns:a14="http://schemas.microsoft.com/office/drawing/2010/main" val="0"/>
+                </a:ext>
+              </a:extLst>
+            </a:blip>
+            <a:srcRect l="16636" t="6476" r="12002" b="10947"/>
+            <a:stretch/>
+          </p:blipFill>
+          <p:spPr>
+            <a:xfrm>
+              <a:off x="2441269" y="138022"/>
+              <a:ext cx="5436995" cy="4194353"/>
+            </a:xfrm>
+            <a:prstGeom prst="rect">
+              <a:avLst/>
+            </a:prstGeom>
+            <a:ln w="3175">
+              <a:solidFill>
+                <a:schemeClr val="tx1"/>
+              </a:solidFill>
+            </a:ln>
+          </p:spPr>
+        </p:pic>
+        <p:pic>
+          <p:nvPicPr>
+            <p:cNvPr id="8" name="Picture 7"/>
+            <p:cNvPicPr>
+              <a:picLocks noChangeAspect="1"/>
+            </p:cNvPicPr>
+            <p:nvPr/>
+          </p:nvPicPr>
+          <p:blipFill>
+            <a:blip r:embed="rId3" cstate="print">
+              <a:extLst>
+                <a:ext uri="{28A0092B-C50C-407E-A947-70E740481C1C}">
+                  <a14:useLocalDpi xmlns:a14="http://schemas.microsoft.com/office/drawing/2010/main" val="0"/>
+                </a:ext>
+              </a:extLst>
+            </a:blip>
+            <a:stretch>
+              <a:fillRect/>
+            </a:stretch>
+          </p:blipFill>
+          <p:spPr>
+            <a:xfrm>
+              <a:off x="7992184" y="138022"/>
+              <a:ext cx="2926528" cy="1927852"/>
+            </a:xfrm>
+            <a:prstGeom prst="rect">
+              <a:avLst/>
+            </a:prstGeom>
+            <a:ln w="3175">
+              <a:solidFill>
+                <a:schemeClr val="tx1"/>
+              </a:solidFill>
+            </a:ln>
+          </p:spPr>
+        </p:pic>
+        <p:pic>
+          <p:nvPicPr>
+            <p:cNvPr id="9" name="Picture 8"/>
+            <p:cNvPicPr>
+              <a:picLocks noChangeAspect="1"/>
+            </p:cNvPicPr>
+            <p:nvPr/>
+          </p:nvPicPr>
+          <p:blipFill>
+            <a:blip r:embed="rId4">
+              <a:extLst>
+                <a:ext uri="{28A0092B-C50C-407E-A947-70E740481C1C}">
+                  <a14:useLocalDpi xmlns:a14="http://schemas.microsoft.com/office/drawing/2010/main" val="0"/>
+                </a:ext>
+              </a:extLst>
+            </a:blip>
+            <a:stretch>
+              <a:fillRect/>
+            </a:stretch>
+          </p:blipFill>
+          <p:spPr>
+            <a:xfrm>
+              <a:off x="7992184" y="2133115"/>
+              <a:ext cx="2926528" cy="2199260"/>
+            </a:xfrm>
+            <a:prstGeom prst="rect">
+              <a:avLst/>
+            </a:prstGeom>
+            <a:ln w="3175">
+              <a:solidFill>
+                <a:schemeClr val="tx1"/>
+              </a:solidFill>
+            </a:ln>
+          </p:spPr>
+        </p:pic>
+      </p:grpSp>
+    </p:spTree>
+    <p:extLst>
+      <p:ext uri="{BB962C8B-B14F-4D97-AF65-F5344CB8AC3E}">
+        <p14:creationId xmlns:p14="http://schemas.microsoft.com/office/powerpoint/2010/main" val="493966486"/>
+      </p:ext>
+    </p:extLst>
+  </p:cSld>
+  <p:clrMapOvr>
+    <a:masterClrMapping/>
+  </p:clrMapOvr>
+</p:sld>
+</file>
+
+<file path=ppt/slides/slide4.xml><?xml version="1.0" encoding="utf-8"?>
+<p:sld xmlns:a="http://schemas.openxmlformats.org/drawingml/2006/main" xmlns:r="http://schemas.openxmlformats.org/officeDocument/2006/relationships" xmlns:p="http://schemas.openxmlformats.org/presentationml/2006/main">
+  <p:cSld>
+    <p:spTree>
+      <p:nvGrpSpPr>
+        <p:cNvPr id="1" name=""/>
+        <p:cNvGrpSpPr/>
+        <p:nvPr/>
+      </p:nvGrpSpPr>
+      <p:grpSpPr>
+        <a:xfrm>
+          <a:off x="0" y="0"/>
+          <a:ext cx="0" cy="0"/>
+          <a:chOff x="0" y="0"/>
+          <a:chExt cx="0" cy="0"/>
+        </a:xfrm>
+      </p:grpSpPr>
+      <p:grpSp>
+        <p:nvGrpSpPr>
+          <p:cNvPr id="10" name="Group 9"/>
+          <p:cNvGrpSpPr/>
+          <p:nvPr/>
+        </p:nvGrpSpPr>
+        <p:grpSpPr>
+          <a:xfrm>
             <a:off x="957534" y="362311"/>
             <a:ext cx="10505910" cy="6099700"/>
             <a:chOff x="2441269" y="138024"/>
@@ -3533,7 +3683,7 @@
 </p:sld>
 </file>
 
-<file path=ppt/slides/slide4.xml><?xml version="1.0" encoding="utf-8"?>
+<file path=ppt/slides/slide5.xml><?xml version="1.0" encoding="utf-8"?>
 <p:sld xmlns:a="http://schemas.openxmlformats.org/drawingml/2006/main" xmlns:r="http://schemas.openxmlformats.org/officeDocument/2006/relationships" xmlns:p="http://schemas.openxmlformats.org/presentationml/2006/main">
   <p:cSld>
     <p:spTree>

</xml_diff>